<commit_message>
a few last minute edits.
</commit_message>
<xml_diff>
--- a/Final Presentation.pptx
+++ b/Final Presentation.pptx
@@ -15658,16 +15658,6 @@
                   <a:schemeClr val="bg1"/>
                 </a:solidFill>
               </a:rPr>
-              <a:t>Although various crimes and their underlying nature seem to be unpredictable, how unforeseeable are they really? </a:t>
-            </a:r>
-          </a:p>
-          <a:p>
-            <a:r>
-              <a:rPr lang="en-US" sz="2000" dirty="0">
-                <a:solidFill>
-                  <a:schemeClr val="bg1"/>
-                </a:solidFill>
-              </a:rPr>
               <a:t>Is Charlotte a safe place to live?</a:t>
             </a:r>
           </a:p>

</xml_diff>